<commit_message>
feat: SL21 chart color
</commit_message>
<xml_diff>
--- a/template/test.pptx
+++ b/template/test.pptx
@@ -9,7 +9,7 @@
   </p:notesMasterIdLst>
   <p:sldIdLst>
     <p:sldId id="342" r:id="rId2"/>
-    <p:sldId id="346" r:id="rId3"/>
+    <p:sldId id="347" r:id="rId3"/>
     <p:sldId id="344" r:id="rId4"/>
     <p:sldId id="343" r:id="rId5"/>
     <p:sldId id="289" r:id="rId6"/>
@@ -270,7 +270,7 @@
               <c:strCache>
                 <c:ptCount val="1"/>
                 <c:pt idx="0">
-                  <c:v>카드사용건수(건)</c:v>
+                  <c:v>매출금액(천만원)</c:v>
                 </c:pt>
               </c:strCache>
             </c:strRef>
@@ -495,7 +495,7 @@
               <c:strCache>
                 <c:ptCount val="1"/>
                 <c:pt idx="0">
-                  <c:v>카드소비금액(천만원)</c:v>
+                  <c:v>매출건수(건)</c:v>
                 </c:pt>
               </c:strCache>
             </c:strRef>
@@ -992,7 +992,111 @@
     </mc:Fallback>
   </mc:AlternateContent>
   <c:chart>
-    <c:autoTitleDeleted val="1"/>
+    <c:title>
+      <c:tx>
+        <c:rich>
+          <a:bodyPr rot="0" spcFirstLastPara="1" vertOverflow="ellipsis" vert="horz" wrap="square" anchor="ctr" anchorCtr="1"/>
+          <a:lstStyle/>
+          <a:p>
+            <a:pPr>
+              <a:defRPr sz="1100" b="0" i="0" u="none" strike="noStrike" kern="1200" spc="0" baseline="0">
+                <a:solidFill>
+                  <a:schemeClr val="tx1">
+                    <a:lumMod val="65000"/>
+                    <a:lumOff val="35000"/>
+                  </a:schemeClr>
+                </a:solidFill>
+                <a:latin typeface="Noto Sans KR" panose="020B0200000000000000" pitchFamily="50" charset="-127"/>
+                <a:ea typeface="Noto Sans KR" panose="020B0200000000000000" pitchFamily="50" charset="-127"/>
+                <a:cs typeface="+mn-cs"/>
+              </a:defRPr>
+            </a:pPr>
+            <a:r>
+              <a:rPr lang="en-US" sz="1100" b="1" dirty="0" err="1">
+                <a:solidFill>
+                  <a:srgbClr val="1F4E79"/>
+                </a:solidFill>
+              </a:rPr>
+              <a:t>축제</a:t>
+            </a:r>
+            <a:r>
+              <a:rPr lang="en-US" sz="1100" b="1" dirty="0">
+                <a:solidFill>
+                  <a:srgbClr val="1F4E79"/>
+                </a:solidFill>
+              </a:rPr>
+              <a:t> </a:t>
+            </a:r>
+            <a:r>
+              <a:rPr lang="en-US" sz="1100" b="1" dirty="0" err="1">
+                <a:solidFill>
+                  <a:srgbClr val="1F4E79"/>
+                </a:solidFill>
+              </a:rPr>
+              <a:t>전후</a:t>
+            </a:r>
+            <a:r>
+              <a:rPr lang="en-US" sz="1100" b="1" dirty="0">
+                <a:solidFill>
+                  <a:srgbClr val="1F4E79"/>
+                </a:solidFill>
+              </a:rPr>
+              <a:t> </a:t>
+            </a:r>
+            <a:r>
+              <a:rPr lang="ko-KR" altLang="en-US" sz="1100" b="1" dirty="0">
+                <a:solidFill>
+                  <a:srgbClr val="1F4E79"/>
+                </a:solidFill>
+              </a:rPr>
+              <a:t>방문인구 </a:t>
+            </a:r>
+            <a:r>
+              <a:rPr lang="en-US" sz="1100" b="1" dirty="0" err="1">
+                <a:solidFill>
+                  <a:srgbClr val="1F4E79"/>
+                </a:solidFill>
+              </a:rPr>
+              <a:t>비교</a:t>
+            </a:r>
+            <a:endParaRPr lang="en-US" sz="1100" b="1" dirty="0">
+              <a:solidFill>
+                <a:srgbClr val="1F4E79"/>
+              </a:solidFill>
+            </a:endParaRPr>
+          </a:p>
+        </c:rich>
+      </c:tx>
+      <c:overlay val="0"/>
+      <c:spPr>
+        <a:noFill/>
+        <a:ln>
+          <a:noFill/>
+        </a:ln>
+        <a:effectLst/>
+      </c:spPr>
+      <c:txPr>
+        <a:bodyPr rot="0" spcFirstLastPara="1" vertOverflow="ellipsis" vert="horz" wrap="square" anchor="ctr" anchorCtr="1"/>
+        <a:lstStyle/>
+        <a:p>
+          <a:pPr>
+            <a:defRPr sz="1100" b="0" i="0" u="none" strike="noStrike" kern="1200" spc="0" baseline="0">
+              <a:solidFill>
+                <a:schemeClr val="tx1">
+                  <a:lumMod val="65000"/>
+                  <a:lumOff val="35000"/>
+                </a:schemeClr>
+              </a:solidFill>
+              <a:latin typeface="Noto Sans KR" panose="020B0200000000000000" pitchFamily="50" charset="-127"/>
+              <a:ea typeface="Noto Sans KR" panose="020B0200000000000000" pitchFamily="50" charset="-127"/>
+              <a:cs typeface="+mn-cs"/>
+            </a:defRPr>
+          </a:pPr>
+          <a:endParaRPr lang="en-US"/>
+        </a:p>
+      </c:txPr>
+    </c:title>
+    <c:autoTitleDeleted val="0"/>
     <c:plotArea>
       <c:layout/>
       <c:barChart>
@@ -1008,7 +1112,7 @@
               <c:strCache>
                 <c:ptCount val="1"/>
                 <c:pt idx="0">
-                  <c:v>계열 1</c:v>
+                  <c:v>매출건수(건)</c:v>
                 </c:pt>
               </c:strCache>
             </c:strRef>
@@ -1024,8 +1128,141 @@
           </c:spPr>
           <c:invertIfNegative val="0"/>
           <c:dPt>
+            <c:idx val="0"/>
+            <c:invertIfNegative val="1"/>
+            <c:bubble3D val="0"/>
+            <c:spPr>
+              <a:solidFill>
+                <a:srgbClr val="1F4E79"/>
+              </a:solidFill>
+              <a:ln>
+                <a:noFill/>
+              </a:ln>
+              <a:effectLst/>
+            </c:spPr>
+            <c:extLst>
+              <c:ext xmlns:c16="http://schemas.microsoft.com/office/drawing/2014/chart" uri="{C3380CC4-5D6E-409C-BE32-E72D297353CC}">
+                <c16:uniqueId val="{00000001-1C7C-4F3A-97BD-5A3CDDB87122}"/>
+              </c:ext>
+            </c:extLst>
+          </c:dPt>
+          <c:dPt>
             <c:idx val="1"/>
             <c:invertIfNegative val="0"/>
+            <c:bubble3D val="0"/>
+            <c:spPr>
+              <a:solidFill>
+                <a:srgbClr val="1F4E79"/>
+              </a:solidFill>
+              <a:ln>
+                <a:noFill/>
+              </a:ln>
+              <a:effectLst/>
+            </c:spPr>
+            <c:extLst>
+              <c:ext xmlns:c16="http://schemas.microsoft.com/office/drawing/2014/chart" uri="{C3380CC4-5D6E-409C-BE32-E72D297353CC}">
+                <c16:uniqueId val="{00000003-1C7C-4F3A-97BD-5A3CDDB87122}"/>
+              </c:ext>
+            </c:extLst>
+          </c:dPt>
+          <c:dPt>
+            <c:idx val="2"/>
+            <c:invertIfNegative val="1"/>
+            <c:bubble3D val="0"/>
+            <c:spPr>
+              <a:solidFill>
+                <a:srgbClr val="1F4E79"/>
+              </a:solidFill>
+              <a:ln>
+                <a:noFill/>
+              </a:ln>
+              <a:effectLst/>
+            </c:spPr>
+            <c:extLst>
+              <c:ext xmlns:c16="http://schemas.microsoft.com/office/drawing/2014/chart" uri="{C3380CC4-5D6E-409C-BE32-E72D297353CC}">
+                <c16:uniqueId val="{00000005-1C7C-4F3A-97BD-5A3CDDB87122}"/>
+              </c:ext>
+            </c:extLst>
+          </c:dPt>
+          <c:dPt>
+            <c:idx val="3"/>
+            <c:invertIfNegative val="1"/>
+            <c:bubble3D val="0"/>
+            <c:spPr>
+              <a:solidFill>
+                <a:srgbClr val="1F4E79"/>
+              </a:solidFill>
+              <a:ln>
+                <a:noFill/>
+              </a:ln>
+              <a:effectLst/>
+            </c:spPr>
+            <c:extLst>
+              <c:ext xmlns:c16="http://schemas.microsoft.com/office/drawing/2014/chart" uri="{C3380CC4-5D6E-409C-BE32-E72D297353CC}">
+                <c16:uniqueId val="{00000007-1C7C-4F3A-97BD-5A3CDDB87122}"/>
+              </c:ext>
+            </c:extLst>
+          </c:dPt>
+          <c:dPt>
+            <c:idx val="4"/>
+            <c:invertIfNegative val="1"/>
+            <c:bubble3D val="0"/>
+            <c:spPr>
+              <a:solidFill>
+                <a:srgbClr val="1F4E79"/>
+              </a:solidFill>
+              <a:ln>
+                <a:noFill/>
+              </a:ln>
+              <a:effectLst/>
+            </c:spPr>
+            <c:extLst>
+              <c:ext xmlns:c16="http://schemas.microsoft.com/office/drawing/2014/chart" uri="{C3380CC4-5D6E-409C-BE32-E72D297353CC}">
+                <c16:uniqueId val="{00000009-1C7C-4F3A-97BD-5A3CDDB87122}"/>
+              </c:ext>
+            </c:extLst>
+          </c:dPt>
+          <c:dPt>
+            <c:idx val="5"/>
+            <c:invertIfNegative val="1"/>
+            <c:bubble3D val="0"/>
+            <c:spPr>
+              <a:solidFill>
+                <a:srgbClr val="1F4E79"/>
+              </a:solidFill>
+              <a:ln>
+                <a:noFill/>
+              </a:ln>
+              <a:effectLst/>
+            </c:spPr>
+            <c:extLst>
+              <c:ext xmlns:c16="http://schemas.microsoft.com/office/drawing/2014/chart" uri="{C3380CC4-5D6E-409C-BE32-E72D297353CC}">
+                <c16:uniqueId val="{0000000B-1C7C-4F3A-97BD-5A3CDDB87122}"/>
+              </c:ext>
+            </c:extLst>
+          </c:dPt>
+          <c:dPt>
+            <c:idx val="6"/>
+            <c:invertIfNegative val="1"/>
+            <c:bubble3D val="0"/>
+            <c:spPr>
+              <a:solidFill>
+                <a:srgbClr val="1F4E79"/>
+              </a:solidFill>
+              <a:ln>
+                <a:noFill/>
+              </a:ln>
+              <a:effectLst/>
+            </c:spPr>
+            <c:extLst>
+              <c:ext xmlns:c16="http://schemas.microsoft.com/office/drawing/2014/chart" uri="{C3380CC4-5D6E-409C-BE32-E72D297353CC}">
+                <c16:uniqueId val="{0000000D-1C7C-4F3A-97BD-5A3CDDB87122}"/>
+              </c:ext>
+            </c:extLst>
+          </c:dPt>
+          <c:dPt>
+            <c:idx val="7"/>
+            <c:invertIfNegative val="1"/>
             <c:bubble3D val="0"/>
             <c:spPr>
               <a:solidFill>
@@ -1038,48 +1275,478 @@
             </c:spPr>
             <c:extLst>
               <c:ext xmlns:c16="http://schemas.microsoft.com/office/drawing/2014/chart" uri="{C3380CC4-5D6E-409C-BE32-E72D297353CC}">
-                <c16:uniqueId val="{00000001-4F7C-46E5-BABB-56995A8F630B}"/>
+                <c16:uniqueId val="{0000000F-1C7C-4F3A-97BD-5A3CDDB87122}"/>
+              </c:ext>
+            </c:extLst>
+          </c:dPt>
+          <c:dPt>
+            <c:idx val="8"/>
+            <c:invertIfNegative val="1"/>
+            <c:bubble3D val="0"/>
+            <c:spPr>
+              <a:solidFill>
+                <a:srgbClr val="E74C3C"/>
+              </a:solidFill>
+              <a:ln>
+                <a:noFill/>
+              </a:ln>
+              <a:effectLst/>
+            </c:spPr>
+            <c:extLst>
+              <c:ext xmlns:c16="http://schemas.microsoft.com/office/drawing/2014/chart" uri="{C3380CC4-5D6E-409C-BE32-E72D297353CC}">
+                <c16:uniqueId val="{00000011-1C7C-4F3A-97BD-5A3CDDB87122}"/>
+              </c:ext>
+            </c:extLst>
+          </c:dPt>
+          <c:dPt>
+            <c:idx val="9"/>
+            <c:invertIfNegative val="1"/>
+            <c:bubble3D val="0"/>
+            <c:spPr>
+              <a:solidFill>
+                <a:srgbClr val="E74C3C"/>
+              </a:solidFill>
+              <a:ln>
+                <a:noFill/>
+              </a:ln>
+              <a:effectLst/>
+            </c:spPr>
+            <c:extLst>
+              <c:ext xmlns:c16="http://schemas.microsoft.com/office/drawing/2014/chart" uri="{C3380CC4-5D6E-409C-BE32-E72D297353CC}">
+                <c16:uniqueId val="{00000013-1C7C-4F3A-97BD-5A3CDDB87122}"/>
+              </c:ext>
+            </c:extLst>
+          </c:dPt>
+          <c:dPt>
+            <c:idx val="10"/>
+            <c:invertIfNegative val="1"/>
+            <c:bubble3D val="0"/>
+            <c:spPr>
+              <a:solidFill>
+                <a:srgbClr val="E74C3C"/>
+              </a:solidFill>
+              <a:ln>
+                <a:noFill/>
+              </a:ln>
+              <a:effectLst/>
+            </c:spPr>
+            <c:extLst>
+              <c:ext xmlns:c16="http://schemas.microsoft.com/office/drawing/2014/chart" uri="{C3380CC4-5D6E-409C-BE32-E72D297353CC}">
+                <c16:uniqueId val="{00000015-1C7C-4F3A-97BD-5A3CDDB87122}"/>
+              </c:ext>
+            </c:extLst>
+          </c:dPt>
+          <c:dPt>
+            <c:idx val="11"/>
+            <c:invertIfNegative val="1"/>
+            <c:bubble3D val="0"/>
+            <c:spPr>
+              <a:solidFill>
+                <a:srgbClr val="E74C3C"/>
+              </a:solidFill>
+              <a:ln>
+                <a:noFill/>
+              </a:ln>
+              <a:effectLst/>
+            </c:spPr>
+            <c:extLst>
+              <c:ext xmlns:c16="http://schemas.microsoft.com/office/drawing/2014/chart" uri="{C3380CC4-5D6E-409C-BE32-E72D297353CC}">
+                <c16:uniqueId val="{00000017-1C7C-4F3A-97BD-5A3CDDB87122}"/>
+              </c:ext>
+            </c:extLst>
+          </c:dPt>
+          <c:dPt>
+            <c:idx val="12"/>
+            <c:invertIfNegative val="1"/>
+            <c:bubble3D val="0"/>
+            <c:spPr>
+              <a:solidFill>
+                <a:srgbClr val="E74C3C"/>
+              </a:solidFill>
+              <a:ln>
+                <a:noFill/>
+              </a:ln>
+              <a:effectLst/>
+            </c:spPr>
+            <c:extLst>
+              <c:ext xmlns:c16="http://schemas.microsoft.com/office/drawing/2014/chart" uri="{C3380CC4-5D6E-409C-BE32-E72D297353CC}">
+                <c16:uniqueId val="{00000019-1C7C-4F3A-97BD-5A3CDDB87122}"/>
+              </c:ext>
+            </c:extLst>
+          </c:dPt>
+          <c:dPt>
+            <c:idx val="13"/>
+            <c:invertIfNegative val="1"/>
+            <c:bubble3D val="0"/>
+            <c:spPr>
+              <a:solidFill>
+                <a:srgbClr val="E74C3C"/>
+              </a:solidFill>
+              <a:ln>
+                <a:noFill/>
+              </a:ln>
+              <a:effectLst/>
+            </c:spPr>
+            <c:extLst>
+              <c:ext xmlns:c16="http://schemas.microsoft.com/office/drawing/2014/chart" uri="{C3380CC4-5D6E-409C-BE32-E72D297353CC}">
+                <c16:uniqueId val="{0000001B-1C7C-4F3A-97BD-5A3CDDB87122}"/>
+              </c:ext>
+            </c:extLst>
+          </c:dPt>
+          <c:dPt>
+            <c:idx val="14"/>
+            <c:invertIfNegative val="1"/>
+            <c:bubble3D val="0"/>
+            <c:spPr>
+              <a:solidFill>
+                <a:srgbClr val="E74C3C"/>
+              </a:solidFill>
+              <a:ln>
+                <a:noFill/>
+              </a:ln>
+              <a:effectLst/>
+            </c:spPr>
+            <c:extLst>
+              <c:ext xmlns:c16="http://schemas.microsoft.com/office/drawing/2014/chart" uri="{C3380CC4-5D6E-409C-BE32-E72D297353CC}">
+                <c16:uniqueId val="{0000001D-1C7C-4F3A-97BD-5A3CDDB87122}"/>
+              </c:ext>
+            </c:extLst>
+          </c:dPt>
+          <c:dPt>
+            <c:idx val="15"/>
+            <c:invertIfNegative val="1"/>
+            <c:bubble3D val="0"/>
+            <c:spPr>
+              <a:solidFill>
+                <a:srgbClr val="E74C3C"/>
+              </a:solidFill>
+              <a:ln>
+                <a:noFill/>
+              </a:ln>
+              <a:effectLst/>
+            </c:spPr>
+            <c:extLst>
+              <c:ext xmlns:c16="http://schemas.microsoft.com/office/drawing/2014/chart" uri="{C3380CC4-5D6E-409C-BE32-E72D297353CC}">
+                <c16:uniqueId val="{0000001F-1C7C-4F3A-97BD-5A3CDDB87122}"/>
+              </c:ext>
+            </c:extLst>
+          </c:dPt>
+          <c:dPt>
+            <c:idx val="16"/>
+            <c:invertIfNegative val="1"/>
+            <c:bubble3D val="0"/>
+            <c:spPr>
+              <a:solidFill>
+                <a:srgbClr val="E74C3C"/>
+              </a:solidFill>
+              <a:ln>
+                <a:noFill/>
+              </a:ln>
+              <a:effectLst/>
+            </c:spPr>
+            <c:extLst>
+              <c:ext xmlns:c16="http://schemas.microsoft.com/office/drawing/2014/chart" uri="{C3380CC4-5D6E-409C-BE32-E72D297353CC}">
+                <c16:uniqueId val="{00000021-1C7C-4F3A-97BD-5A3CDDB87122}"/>
+              </c:ext>
+            </c:extLst>
+          </c:dPt>
+          <c:dPt>
+            <c:idx val="17"/>
+            <c:invertIfNegative val="1"/>
+            <c:bubble3D val="0"/>
+            <c:spPr>
+              <a:solidFill>
+                <a:srgbClr val="1F4E79"/>
+              </a:solidFill>
+              <a:ln>
+                <a:noFill/>
+              </a:ln>
+              <a:effectLst/>
+            </c:spPr>
+            <c:extLst>
+              <c:ext xmlns:c16="http://schemas.microsoft.com/office/drawing/2014/chart" uri="{C3380CC4-5D6E-409C-BE32-E72D297353CC}">
+                <c16:uniqueId val="{00000023-1C7C-4F3A-97BD-5A3CDDB87122}"/>
+              </c:ext>
+            </c:extLst>
+          </c:dPt>
+          <c:dPt>
+            <c:idx val="18"/>
+            <c:invertIfNegative val="1"/>
+            <c:bubble3D val="0"/>
+            <c:spPr>
+              <a:solidFill>
+                <a:srgbClr val="1F4E79"/>
+              </a:solidFill>
+              <a:ln>
+                <a:noFill/>
+              </a:ln>
+              <a:effectLst/>
+            </c:spPr>
+            <c:extLst>
+              <c:ext xmlns:c16="http://schemas.microsoft.com/office/drawing/2014/chart" uri="{C3380CC4-5D6E-409C-BE32-E72D297353CC}">
+                <c16:uniqueId val="{00000025-1C7C-4F3A-97BD-5A3CDDB87122}"/>
+              </c:ext>
+            </c:extLst>
+          </c:dPt>
+          <c:dPt>
+            <c:idx val="19"/>
+            <c:invertIfNegative val="1"/>
+            <c:bubble3D val="0"/>
+            <c:spPr>
+              <a:solidFill>
+                <a:srgbClr val="1F4E79"/>
+              </a:solidFill>
+              <a:ln>
+                <a:noFill/>
+              </a:ln>
+              <a:effectLst/>
+            </c:spPr>
+            <c:extLst>
+              <c:ext xmlns:c16="http://schemas.microsoft.com/office/drawing/2014/chart" uri="{C3380CC4-5D6E-409C-BE32-E72D297353CC}">
+                <c16:uniqueId val="{00000027-1C7C-4F3A-97BD-5A3CDDB87122}"/>
+              </c:ext>
+            </c:extLst>
+          </c:dPt>
+          <c:dPt>
+            <c:idx val="20"/>
+            <c:invertIfNegative val="1"/>
+            <c:bubble3D val="0"/>
+            <c:spPr>
+              <a:solidFill>
+                <a:srgbClr val="1F4E79"/>
+              </a:solidFill>
+              <a:ln>
+                <a:noFill/>
+              </a:ln>
+              <a:effectLst/>
+            </c:spPr>
+            <c:extLst>
+              <c:ext xmlns:c16="http://schemas.microsoft.com/office/drawing/2014/chart" uri="{C3380CC4-5D6E-409C-BE32-E72D297353CC}">
+                <c16:uniqueId val="{00000029-1C7C-4F3A-97BD-5A3CDDB87122}"/>
+              </c:ext>
+            </c:extLst>
+          </c:dPt>
+          <c:dPt>
+            <c:idx val="21"/>
+            <c:invertIfNegative val="1"/>
+            <c:bubble3D val="0"/>
+            <c:spPr>
+              <a:solidFill>
+                <a:srgbClr val="1F4E79"/>
+              </a:solidFill>
+              <a:ln>
+                <a:noFill/>
+              </a:ln>
+              <a:effectLst/>
+            </c:spPr>
+            <c:extLst>
+              <c:ext xmlns:c16="http://schemas.microsoft.com/office/drawing/2014/chart" uri="{C3380CC4-5D6E-409C-BE32-E72D297353CC}">
+                <c16:uniqueId val="{0000002B-1C7C-4F3A-97BD-5A3CDDB87122}"/>
+              </c:ext>
+            </c:extLst>
+          </c:dPt>
+          <c:dPt>
+            <c:idx val="22"/>
+            <c:invertIfNegative val="1"/>
+            <c:bubble3D val="0"/>
+            <c:spPr>
+              <a:solidFill>
+                <a:srgbClr val="1F4E79"/>
+              </a:solidFill>
+              <a:ln>
+                <a:noFill/>
+              </a:ln>
+              <a:effectLst/>
+            </c:spPr>
+            <c:extLst>
+              <c:ext xmlns:c16="http://schemas.microsoft.com/office/drawing/2014/chart" uri="{C3380CC4-5D6E-409C-BE32-E72D297353CC}">
+                <c16:uniqueId val="{0000002D-1C7C-4F3A-97BD-5A3CDDB87122}"/>
+              </c:ext>
+            </c:extLst>
+          </c:dPt>
+          <c:dPt>
+            <c:idx val="23"/>
+            <c:invertIfNegative val="1"/>
+            <c:bubble3D val="0"/>
+            <c:spPr>
+              <a:solidFill>
+                <a:srgbClr val="1F4E79"/>
+              </a:solidFill>
+              <a:ln>
+                <a:noFill/>
+              </a:ln>
+              <a:effectLst/>
+            </c:spPr>
+            <c:extLst>
+              <c:ext xmlns:c16="http://schemas.microsoft.com/office/drawing/2014/chart" uri="{C3380CC4-5D6E-409C-BE32-E72D297353CC}">
+                <c16:uniqueId val="{0000002F-1C7C-4F3A-97BD-5A3CDDB87122}"/>
               </c:ext>
             </c:extLst>
           </c:dPt>
           <c:cat>
             <c:strRef>
-              <c:f>Sheet1!$A$2:$A$4</c:f>
+              <c:f>Sheet1!$A$2:$A$25</c:f>
               <c:strCache>
-                <c:ptCount val="3"/>
+                <c:ptCount val="24"/>
                 <c:pt idx="0">
-                  <c:v>1주 이전</c:v>
+                  <c:v>D-7</c:v>
                 </c:pt>
                 <c:pt idx="1">
-                  <c:v>축제 기간</c:v>
+                  <c:v>D-6</c:v>
                 </c:pt>
                 <c:pt idx="2">
-                  <c:v>1주 이후</c:v>
+                  <c:v>D-5</c:v>
+                </c:pt>
+                <c:pt idx="3">
+                  <c:v>D-4</c:v>
+                </c:pt>
+                <c:pt idx="4">
+                  <c:v>D-3</c:v>
+                </c:pt>
+                <c:pt idx="5">
+                  <c:v>D-2</c:v>
+                </c:pt>
+                <c:pt idx="6">
+                  <c:v>D-1</c:v>
+                </c:pt>
+                <c:pt idx="7">
+                  <c:v>DAY1</c:v>
+                </c:pt>
+                <c:pt idx="8">
+                  <c:v>DAY2</c:v>
+                </c:pt>
+                <c:pt idx="9">
+                  <c:v>DAY3</c:v>
+                </c:pt>
+                <c:pt idx="10">
+                  <c:v>DAY4</c:v>
+                </c:pt>
+                <c:pt idx="11">
+                  <c:v>DAY5</c:v>
+                </c:pt>
+                <c:pt idx="12">
+                  <c:v>DAY6</c:v>
+                </c:pt>
+                <c:pt idx="13">
+                  <c:v>DAY7</c:v>
+                </c:pt>
+                <c:pt idx="14">
+                  <c:v>DAY8</c:v>
+                </c:pt>
+                <c:pt idx="15">
+                  <c:v>DAY9</c:v>
+                </c:pt>
+                <c:pt idx="16">
+                  <c:v>DAY10</c:v>
+                </c:pt>
+                <c:pt idx="17">
+                  <c:v>D+1</c:v>
+                </c:pt>
+                <c:pt idx="18">
+                  <c:v>D+2</c:v>
+                </c:pt>
+                <c:pt idx="19">
+                  <c:v>D+3</c:v>
+                </c:pt>
+                <c:pt idx="20">
+                  <c:v>D+4</c:v>
+                </c:pt>
+                <c:pt idx="21">
+                  <c:v>D+5</c:v>
+                </c:pt>
+                <c:pt idx="22">
+                  <c:v>D+6</c:v>
+                </c:pt>
+                <c:pt idx="23">
+                  <c:v>D+7</c:v>
                 </c:pt>
               </c:strCache>
             </c:strRef>
           </c:cat>
           <c:val>
             <c:numRef>
-              <c:f>Sheet1!$B$2:$B$4</c:f>
+              <c:f>Sheet1!$B$2:$B$25</c:f>
               <c:numCache>
                 <c:formatCode>General</c:formatCode>
-                <c:ptCount val="3"/>
+                <c:ptCount val="24"/>
                 <c:pt idx="0">
-                  <c:v>4.3</c:v>
+                  <c:v>0</c:v>
                 </c:pt>
                 <c:pt idx="1">
-                  <c:v>2.5</c:v>
+                  <c:v>0</c:v>
                 </c:pt>
                 <c:pt idx="2">
-                  <c:v>3.5</c:v>
+                  <c:v>416</c:v>
+                </c:pt>
+                <c:pt idx="3">
+                  <c:v>400</c:v>
+                </c:pt>
+                <c:pt idx="4">
+                  <c:v>437</c:v>
+                </c:pt>
+                <c:pt idx="5">
+                  <c:v>800</c:v>
+                </c:pt>
+                <c:pt idx="6">
+                  <c:v>587</c:v>
+                </c:pt>
+                <c:pt idx="7">
+                  <c:v>341</c:v>
+                </c:pt>
+                <c:pt idx="8">
+                  <c:v>464</c:v>
+                </c:pt>
+                <c:pt idx="9">
+                  <c:v>431</c:v>
+                </c:pt>
+                <c:pt idx="10">
+                  <c:v>404</c:v>
+                </c:pt>
+                <c:pt idx="11">
+                  <c:v>608</c:v>
+                </c:pt>
+                <c:pt idx="12">
+                  <c:v>576</c:v>
+                </c:pt>
+                <c:pt idx="13">
+                  <c:v>666</c:v>
+                </c:pt>
+                <c:pt idx="14">
+                  <c:v>394</c:v>
+                </c:pt>
+                <c:pt idx="15">
+                  <c:v>469</c:v>
+                </c:pt>
+                <c:pt idx="16">
+                  <c:v>554</c:v>
+                </c:pt>
+                <c:pt idx="17">
+                  <c:v>560</c:v>
+                </c:pt>
+                <c:pt idx="18">
+                  <c:v>469</c:v>
+                </c:pt>
+                <c:pt idx="19">
+                  <c:v>975</c:v>
+                </c:pt>
+                <c:pt idx="20">
+                  <c:v>767</c:v>
+                </c:pt>
+                <c:pt idx="21">
+                  <c:v>448</c:v>
+                </c:pt>
+                <c:pt idx="22">
+                  <c:v>367</c:v>
+                </c:pt>
+                <c:pt idx="23">
+                  <c:v>310</c:v>
                 </c:pt>
               </c:numCache>
             </c:numRef>
           </c:val>
           <c:extLst>
             <c:ext xmlns:c16="http://schemas.microsoft.com/office/drawing/2014/chart" uri="{C3380CC4-5D6E-409C-BE32-E72D297353CC}">
-              <c16:uniqueId val="{00000000-4F7C-46E5-BABB-56995A8F630B}"/>
+              <c16:uniqueId val="{00000030-1C7C-4F3A-97BD-5A3CDDB87122}"/>
             </c:ext>
           </c:extLst>
         </c:ser>
@@ -1091,13 +1758,12 @@
           <c:showPercent val="0"/>
           <c:showBubbleSize val="0"/>
         </c:dLbls>
-        <c:gapWidth val="219"/>
-        <c:overlap val="-27"/>
-        <c:axId val="1100519775"/>
-        <c:axId val="1100520255"/>
+        <c:gapWidth val="100"/>
+        <c:axId val="1100435295"/>
+        <c:axId val="1100427135"/>
       </c:barChart>
       <c:catAx>
-        <c:axId val="1100519775"/>
+        <c:axId val="1100435295"/>
         <c:scaling>
           <c:orientation val="minMax"/>
         </c:scaling>
@@ -1125,7 +1791,7 @@
           <a:lstStyle/>
           <a:p>
             <a:pPr>
-              <a:defRPr sz="1197" b="0" i="0" u="none" strike="noStrike" kern="1200" baseline="0">
+              <a:defRPr sz="900" b="0" i="0" u="none" strike="noStrike" kern="1200" baseline="0">
                 <a:solidFill>
                   <a:schemeClr val="tx1">
                     <a:lumMod val="65000"/>
@@ -1140,7 +1806,7 @@
             <a:endParaRPr lang="ko-KR"/>
           </a:p>
         </c:txPr>
-        <c:crossAx val="1100520255"/>
+        <c:crossAx val="1100427135"/>
         <c:crosses val="autoZero"/>
         <c:auto val="1"/>
         <c:lblAlgn val="ctr"/>
@@ -1148,7 +1814,7 @@
         <c:noMultiLvlLbl val="0"/>
       </c:catAx>
       <c:valAx>
-        <c:axId val="1100520255"/>
+        <c:axId val="1100427135"/>
         <c:scaling>
           <c:orientation val="minMax"/>
         </c:scaling>
@@ -1184,7 +1850,7 @@
           <a:lstStyle/>
           <a:p>
             <a:pPr>
-              <a:defRPr sz="1197" b="0" i="0" u="none" strike="noStrike" kern="1200" baseline="0">
+              <a:defRPr sz="1000" b="0" i="0" u="none" strike="noStrike" kern="1200" baseline="0">
                 <a:solidFill>
                   <a:schemeClr val="tx1">
                     <a:lumMod val="65000"/>
@@ -1199,7 +1865,7 @@
             <a:endParaRPr lang="ko-KR"/>
           </a:p>
         </c:txPr>
-        <c:crossAx val="1100519775"/>
+        <c:crossAx val="1100435295"/>
         <c:crosses val="autoZero"/>
         <c:crossBetween val="between"/>
       </c:valAx>
@@ -3963,7 +4629,7 @@
         <p:cNvPr id="1" name="">
           <a:extLst>
             <a:ext uri="{FF2B5EF4-FFF2-40B4-BE49-F238E27FC236}">
-              <a16:creationId xmlns:a16="http://schemas.microsoft.com/office/drawing/2014/main" id="{E177935D-9465-6374-0F88-630E2C49901F}"/>
+              <a16:creationId xmlns:a16="http://schemas.microsoft.com/office/drawing/2014/main" id="{9E9497BF-5EFE-8A33-6586-9014D2018BAD}"/>
             </a:ext>
           </a:extLst>
         </p:cNvPr>
@@ -3983,7 +4649,7 @@
           <p:cNvPr id="2" name="Slide Image Placeholder 1">
             <a:extLst>
               <a:ext uri="{FF2B5EF4-FFF2-40B4-BE49-F238E27FC236}">
-                <a16:creationId xmlns:a16="http://schemas.microsoft.com/office/drawing/2014/main" id="{51475E7E-1ED4-30F2-EBAE-8B5B4B8025CD}"/>
+                <a16:creationId xmlns:a16="http://schemas.microsoft.com/office/drawing/2014/main" id="{BCA2730E-8B07-18BE-2CAC-BE625C295A48}"/>
               </a:ext>
             </a:extLst>
           </p:cNvPr>
@@ -4001,7 +4667,7 @@
           <p:cNvPr id="3" name="Notes Placeholder 2">
             <a:extLst>
               <a:ext uri="{FF2B5EF4-FFF2-40B4-BE49-F238E27FC236}">
-                <a16:creationId xmlns:a16="http://schemas.microsoft.com/office/drawing/2014/main" id="{A8820439-F0F8-CBCC-B542-9995371B2D8B}"/>
+                <a16:creationId xmlns:a16="http://schemas.microsoft.com/office/drawing/2014/main" id="{653C755D-7251-AED8-5224-B8BE6AA63F3F}"/>
               </a:ext>
             </a:extLst>
           </p:cNvPr>
@@ -4026,7 +4692,7 @@
           <p:cNvPr id="4" name="Slide Number Placeholder 3">
             <a:extLst>
               <a:ext uri="{FF2B5EF4-FFF2-40B4-BE49-F238E27FC236}">
-                <a16:creationId xmlns:a16="http://schemas.microsoft.com/office/drawing/2014/main" id="{CC34EC56-B68C-6470-A5F3-9FF5495E66CB}"/>
+                <a16:creationId xmlns:a16="http://schemas.microsoft.com/office/drawing/2014/main" id="{2BD8E5B5-4503-CDFC-584F-EEEE67E737B4}"/>
               </a:ext>
             </a:extLst>
           </p:cNvPr>
@@ -4053,7 +4719,7 @@
     </p:spTree>
     <p:extLst>
       <p:ext uri="{BB962C8B-B14F-4D97-AF65-F5344CB8AC3E}">
-        <p14:creationId xmlns:p14="http://schemas.microsoft.com/office/powerpoint/2010/main" val="3436846005"/>
+        <p14:creationId xmlns:p14="http://schemas.microsoft.com/office/powerpoint/2010/main" val="3405468180"/>
       </p:ext>
     </p:extLst>
   </p:cSld>
@@ -8888,7 +9554,7 @@
           <p:nvPr>
             <p:extLst>
               <p:ext uri="{D42A27DB-BD31-4B8C-83A1-F6EECF244321}">
-                <p14:modId xmlns:p14="http://schemas.microsoft.com/office/powerpoint/2010/main" val="2599324993"/>
+                <p14:modId xmlns:p14="http://schemas.microsoft.com/office/powerpoint/2010/main" val="15444305"/>
               </p:ext>
             </p:extLst>
           </p:nvPr>
@@ -9182,7 +9848,7 @@
         <p:cNvPr id="1" name="">
           <a:extLst>
             <a:ext uri="{FF2B5EF4-FFF2-40B4-BE49-F238E27FC236}">
-              <a16:creationId xmlns:a16="http://schemas.microsoft.com/office/drawing/2014/main" id="{1FD9A742-446C-AB1B-6168-7C58EA668E82}"/>
+              <a16:creationId xmlns:a16="http://schemas.microsoft.com/office/drawing/2014/main" id="{D55A07FA-4D5C-5741-A9CA-4BD6E6CBEB36}"/>
             </a:ext>
           </a:extLst>
         </p:cNvPr>
@@ -9202,7 +9868,7 @@
           <p:cNvPr id="74" name="Shape 8">
             <a:extLst>
               <a:ext uri="{FF2B5EF4-FFF2-40B4-BE49-F238E27FC236}">
-                <a16:creationId xmlns:a16="http://schemas.microsoft.com/office/drawing/2014/main" id="{DF09252A-FBA5-1C4D-2C7C-D53207C0D151}"/>
+                <a16:creationId xmlns:a16="http://schemas.microsoft.com/office/drawing/2014/main" id="{4953EB60-33B0-E45C-4512-94D6D3CFCEEA}"/>
               </a:ext>
             </a:extLst>
           </p:cNvPr>
@@ -9244,7 +9910,7 @@
           <p:cNvPr id="6" name="Text 3">
             <a:extLst>
               <a:ext uri="{FF2B5EF4-FFF2-40B4-BE49-F238E27FC236}">
-                <a16:creationId xmlns:a16="http://schemas.microsoft.com/office/drawing/2014/main" id="{477A8A27-61F9-200D-52D5-6D67CD4F94BD}"/>
+                <a16:creationId xmlns:a16="http://schemas.microsoft.com/office/drawing/2014/main" id="{55BCC236-B0BB-BFE7-566E-4A8A029499FC}"/>
               </a:ext>
             </a:extLst>
           </p:cNvPr>
@@ -9352,7 +10018,7 @@
           <p:cNvPr id="9" name="Text 3">
             <a:extLst>
               <a:ext uri="{FF2B5EF4-FFF2-40B4-BE49-F238E27FC236}">
-                <a16:creationId xmlns:a16="http://schemas.microsoft.com/office/drawing/2014/main" id="{5DF68F73-F416-4D95-E5C5-1AEF294964EE}"/>
+                <a16:creationId xmlns:a16="http://schemas.microsoft.com/office/drawing/2014/main" id="{F99CD7BE-F8DB-10EF-ACA0-C4F896759ED6}"/>
               </a:ext>
             </a:extLst>
           </p:cNvPr>
@@ -9393,7 +10059,7 @@
           <p:cNvPr id="2" name="Shape 8">
             <a:extLst>
               <a:ext uri="{FF2B5EF4-FFF2-40B4-BE49-F238E27FC236}">
-                <a16:creationId xmlns:a16="http://schemas.microsoft.com/office/drawing/2014/main" id="{DE425FAB-4317-3200-2783-81FDC57E6B73}"/>
+                <a16:creationId xmlns:a16="http://schemas.microsoft.com/office/drawing/2014/main" id="{80CDEC48-C313-118D-C28D-5FBCE86F34EB}"/>
               </a:ext>
             </a:extLst>
           </p:cNvPr>
@@ -9435,7 +10101,7 @@
           <p:cNvPr id="3" name="Shape 9">
             <a:extLst>
               <a:ext uri="{FF2B5EF4-FFF2-40B4-BE49-F238E27FC236}">
-                <a16:creationId xmlns:a16="http://schemas.microsoft.com/office/drawing/2014/main" id="{999D764B-3C3D-8B8D-5522-B049D13336D5}"/>
+                <a16:creationId xmlns:a16="http://schemas.microsoft.com/office/drawing/2014/main" id="{B46A7340-F6B3-9C0B-9A88-BF6F1762DBD3}"/>
               </a:ext>
             </a:extLst>
           </p:cNvPr>
@@ -9468,7 +10134,7 @@
           <p:cNvPr id="4" name="Image 2" descr="preencoded.png">
             <a:extLst>
               <a:ext uri="{FF2B5EF4-FFF2-40B4-BE49-F238E27FC236}">
-                <a16:creationId xmlns:a16="http://schemas.microsoft.com/office/drawing/2014/main" id="{07746C10-17AF-2B74-8720-A2FD28B5943B}"/>
+                <a16:creationId xmlns:a16="http://schemas.microsoft.com/office/drawing/2014/main" id="{C70A76BA-6509-C063-C0B1-2580BD5E32C7}"/>
               </a:ext>
             </a:extLst>
           </p:cNvPr>
@@ -9497,7 +10163,7 @@
           <p:cNvPr id="7" name="Text 11">
             <a:extLst>
               <a:ext uri="{FF2B5EF4-FFF2-40B4-BE49-F238E27FC236}">
-                <a16:creationId xmlns:a16="http://schemas.microsoft.com/office/drawing/2014/main" id="{0A3D84F9-EB35-C2DE-6A93-6F4476A930B0}"/>
+                <a16:creationId xmlns:a16="http://schemas.microsoft.com/office/drawing/2014/main" id="{BE046F0A-5737-02A7-3ED9-B34D962ADD24}"/>
               </a:ext>
             </a:extLst>
           </p:cNvPr>
@@ -9553,7 +10219,7 @@
           <p:cNvPr id="10" name="Text 13">
             <a:extLst>
               <a:ext uri="{FF2B5EF4-FFF2-40B4-BE49-F238E27FC236}">
-                <a16:creationId xmlns:a16="http://schemas.microsoft.com/office/drawing/2014/main" id="{844725BE-F28D-C99F-46AE-CEA644174F0E}"/>
+                <a16:creationId xmlns:a16="http://schemas.microsoft.com/office/drawing/2014/main" id="{112B5010-0E70-3DD1-2696-5BCADE5D6A97}"/>
               </a:ext>
             </a:extLst>
           </p:cNvPr>
@@ -9609,7 +10275,7 @@
           <p:cNvPr id="11" name="Text 14">
             <a:extLst>
               <a:ext uri="{FF2B5EF4-FFF2-40B4-BE49-F238E27FC236}">
-                <a16:creationId xmlns:a16="http://schemas.microsoft.com/office/drawing/2014/main" id="{CE71C2A0-3569-2A3C-279B-591D1CF57946}"/>
+                <a16:creationId xmlns:a16="http://schemas.microsoft.com/office/drawing/2014/main" id="{4610680E-F803-06AB-0042-26338522E3C3}"/>
               </a:ext>
             </a:extLst>
           </p:cNvPr>
@@ -9676,7 +10342,7 @@
           <p:cNvPr id="49" name="Shape 16">
             <a:extLst>
               <a:ext uri="{FF2B5EF4-FFF2-40B4-BE49-F238E27FC236}">
-                <a16:creationId xmlns:a16="http://schemas.microsoft.com/office/drawing/2014/main" id="{05DEB88F-1C76-AFB6-D22F-C4F31E1B25A8}"/>
+                <a16:creationId xmlns:a16="http://schemas.microsoft.com/office/drawing/2014/main" id="{CDBA1D37-EBCC-30CD-BD3E-6A3E44D4759D}"/>
               </a:ext>
             </a:extLst>
           </p:cNvPr>
@@ -9709,7 +10375,7 @@
           <p:cNvPr id="50" name="Image 3" descr="preencoded.png">
             <a:extLst>
               <a:ext uri="{FF2B5EF4-FFF2-40B4-BE49-F238E27FC236}">
-                <a16:creationId xmlns:a16="http://schemas.microsoft.com/office/drawing/2014/main" id="{53107787-F24C-984C-CD26-418AE7D231A0}"/>
+                <a16:creationId xmlns:a16="http://schemas.microsoft.com/office/drawing/2014/main" id="{1DB6F7CF-8391-F4B4-021A-DE2DC6686BAC}"/>
               </a:ext>
             </a:extLst>
           </p:cNvPr>
@@ -9738,7 +10404,7 @@
           <p:cNvPr id="52" name="Text 18">
             <a:extLst>
               <a:ext uri="{FF2B5EF4-FFF2-40B4-BE49-F238E27FC236}">
-                <a16:creationId xmlns:a16="http://schemas.microsoft.com/office/drawing/2014/main" id="{5ABF2219-03C0-EB16-8FD0-5A47052D7622}"/>
+                <a16:creationId xmlns:a16="http://schemas.microsoft.com/office/drawing/2014/main" id="{1BF14381-DC1D-38AE-73B3-4067BA00A510}"/>
               </a:ext>
             </a:extLst>
           </p:cNvPr>
@@ -9793,7 +10459,7 @@
           <p:cNvPr id="54" name="Text 20">
             <a:extLst>
               <a:ext uri="{FF2B5EF4-FFF2-40B4-BE49-F238E27FC236}">
-                <a16:creationId xmlns:a16="http://schemas.microsoft.com/office/drawing/2014/main" id="{4F979B30-2811-D828-EA2F-A90201E1F649}"/>
+                <a16:creationId xmlns:a16="http://schemas.microsoft.com/office/drawing/2014/main" id="{859A9281-08E4-A270-0681-34638C64B70C}"/>
               </a:ext>
             </a:extLst>
           </p:cNvPr>
@@ -9868,7 +10534,7 @@
           <p:cNvPr id="55" name="Shape 21">
             <a:extLst>
               <a:ext uri="{FF2B5EF4-FFF2-40B4-BE49-F238E27FC236}">
-                <a16:creationId xmlns:a16="http://schemas.microsoft.com/office/drawing/2014/main" id="{2ACA4E51-6ADA-4F0B-7F39-1486FD375357}"/>
+                <a16:creationId xmlns:a16="http://schemas.microsoft.com/office/drawing/2014/main" id="{198BA0E9-849A-2A92-E9FA-47819CBD9484}"/>
               </a:ext>
             </a:extLst>
           </p:cNvPr>
@@ -9905,7 +10571,7 @@
           <p:cNvPr id="56" name="Text 22">
             <a:extLst>
               <a:ext uri="{FF2B5EF4-FFF2-40B4-BE49-F238E27FC236}">
-                <a16:creationId xmlns:a16="http://schemas.microsoft.com/office/drawing/2014/main" id="{5C4708E9-B655-939C-0FBA-D54ADB0B907A}"/>
+                <a16:creationId xmlns:a16="http://schemas.microsoft.com/office/drawing/2014/main" id="{6EE67C40-B94E-EAE8-6B7A-860179DF2353}"/>
               </a:ext>
             </a:extLst>
           </p:cNvPr>
@@ -9950,7 +10616,7 @@
           <p:cNvPr id="57" name="Shape 23">
             <a:extLst>
               <a:ext uri="{FF2B5EF4-FFF2-40B4-BE49-F238E27FC236}">
-                <a16:creationId xmlns:a16="http://schemas.microsoft.com/office/drawing/2014/main" id="{0DAF44BD-D36D-D6CC-EC7C-D9A931F4F195}"/>
+                <a16:creationId xmlns:a16="http://schemas.microsoft.com/office/drawing/2014/main" id="{26ED5BC1-85EB-8E7E-A624-BE3F16C02F99}"/>
               </a:ext>
             </a:extLst>
           </p:cNvPr>
@@ -9992,7 +10658,7 @@
           <p:cNvPr id="58" name="Shape 24">
             <a:extLst>
               <a:ext uri="{FF2B5EF4-FFF2-40B4-BE49-F238E27FC236}">
-                <a16:creationId xmlns:a16="http://schemas.microsoft.com/office/drawing/2014/main" id="{0F88D029-BA65-F7A0-F770-2067F95B8D3D}"/>
+                <a16:creationId xmlns:a16="http://schemas.microsoft.com/office/drawing/2014/main" id="{3C4E8475-4047-80ED-9F30-54249A4DDF31}"/>
               </a:ext>
             </a:extLst>
           </p:cNvPr>
@@ -10025,7 +10691,7 @@
           <p:cNvPr id="59" name="Image 4" descr="preencoded.png">
             <a:extLst>
               <a:ext uri="{FF2B5EF4-FFF2-40B4-BE49-F238E27FC236}">
-                <a16:creationId xmlns:a16="http://schemas.microsoft.com/office/drawing/2014/main" id="{754E78C3-691C-7714-9532-188D96D6CEF8}"/>
+                <a16:creationId xmlns:a16="http://schemas.microsoft.com/office/drawing/2014/main" id="{F527F26C-4B37-6615-2313-1745C03D22B7}"/>
               </a:ext>
             </a:extLst>
           </p:cNvPr>
@@ -10054,7 +10720,7 @@
           <p:cNvPr id="61" name="Text 26">
             <a:extLst>
               <a:ext uri="{FF2B5EF4-FFF2-40B4-BE49-F238E27FC236}">
-                <a16:creationId xmlns:a16="http://schemas.microsoft.com/office/drawing/2014/main" id="{E56928F4-3752-5250-D5FD-B9C19254FBD8}"/>
+                <a16:creationId xmlns:a16="http://schemas.microsoft.com/office/drawing/2014/main" id="{7CF39800-4871-D880-88F4-71FE9E767B00}"/>
               </a:ext>
             </a:extLst>
           </p:cNvPr>
@@ -10107,7 +10773,7 @@
           <p:cNvPr id="63" name="Text 28">
             <a:extLst>
               <a:ext uri="{FF2B5EF4-FFF2-40B4-BE49-F238E27FC236}">
-                <a16:creationId xmlns:a16="http://schemas.microsoft.com/office/drawing/2014/main" id="{EF49EE41-F6D9-69E7-4033-459842451F82}"/>
+                <a16:creationId xmlns:a16="http://schemas.microsoft.com/office/drawing/2014/main" id="{DE931E23-0ABA-F6F2-FF36-E49B8EF6C8EF}"/>
               </a:ext>
             </a:extLst>
           </p:cNvPr>
@@ -10182,7 +10848,7 @@
           <p:cNvPr id="64" name="Shape 29">
             <a:extLst>
               <a:ext uri="{FF2B5EF4-FFF2-40B4-BE49-F238E27FC236}">
-                <a16:creationId xmlns:a16="http://schemas.microsoft.com/office/drawing/2014/main" id="{295F7F2C-A8C3-025F-E390-31A4D7EEC214}"/>
+                <a16:creationId xmlns:a16="http://schemas.microsoft.com/office/drawing/2014/main" id="{969A0DD8-E419-75C8-7499-FD89591E463F}"/>
               </a:ext>
             </a:extLst>
           </p:cNvPr>
@@ -10219,7 +10885,7 @@
           <p:cNvPr id="65" name="Text 30">
             <a:extLst>
               <a:ext uri="{FF2B5EF4-FFF2-40B4-BE49-F238E27FC236}">
-                <a16:creationId xmlns:a16="http://schemas.microsoft.com/office/drawing/2014/main" id="{AA0276E0-0962-40E7-D3EF-14A885B8271D}"/>
+                <a16:creationId xmlns:a16="http://schemas.microsoft.com/office/drawing/2014/main" id="{FAB954CD-189E-5295-DC42-0F8B30D9A894}"/>
               </a:ext>
             </a:extLst>
           </p:cNvPr>
@@ -10261,99 +10927,10 @@
       </p:sp>
       <p:sp>
         <p:nvSpPr>
-          <p:cNvPr id="67" name="Text 31">
-            <a:extLst>
-              <a:ext uri="{FF2B5EF4-FFF2-40B4-BE49-F238E27FC236}">
-                <a16:creationId xmlns:a16="http://schemas.microsoft.com/office/drawing/2014/main" id="{FF4401C0-C70B-F8C1-56A0-0E197FA2DEDF}"/>
-              </a:ext>
-            </a:extLst>
-          </p:cNvPr>
-          <p:cNvSpPr txBox="1"/>
-          <p:nvPr/>
-        </p:nvSpPr>
-        <p:spPr>
-          <a:xfrm>
-            <a:off x="7021860" y="1625677"/>
-            <a:ext cx="2526487" cy="238658"/>
-          </a:xfrm>
-          <a:prstGeom prst="rect">
-            <a:avLst/>
-          </a:prstGeom>
-          <a:noFill/>
-          <a:ln/>
-        </p:spPr>
-        <p:txBody>
-          <a:bodyPr wrap="square" lIns="0" tIns="0" rIns="0" bIns="0" rtlCol="0" anchor="ctr"/>
-          <a:lstStyle/>
-          <a:p>
-            <a:pPr marL="0" indent="0" algn="ctr">
-              <a:buNone/>
-            </a:pPr>
-            <a:r>
-              <a:rPr lang="en-US" sz="1100" b="1" dirty="0">
-                <a:solidFill>
-                  <a:srgbClr val="1F4E79"/>
-                </a:solidFill>
-                <a:latin typeface="Noto Sans KR" pitchFamily="34" charset="0"/>
-                <a:ea typeface="Noto Sans KR" pitchFamily="34" charset="-122"/>
-                <a:cs typeface="Noto Sans KR" pitchFamily="34" charset="-120"/>
-              </a:rPr>
-              <a:t>축제 </a:t>
-            </a:r>
-            <a:r>
-              <a:rPr lang="en-US" sz="1100" b="1" dirty="0" err="1">
-                <a:solidFill>
-                  <a:srgbClr val="1F4E79"/>
-                </a:solidFill>
-                <a:latin typeface="Noto Sans KR" pitchFamily="34" charset="0"/>
-                <a:ea typeface="Noto Sans KR" pitchFamily="34" charset="-122"/>
-                <a:cs typeface="Noto Sans KR" pitchFamily="34" charset="-120"/>
-              </a:rPr>
-              <a:t>전후</a:t>
-            </a:r>
-            <a:r>
-              <a:rPr lang="en-US" sz="1100" b="1" dirty="0">
-                <a:solidFill>
-                  <a:srgbClr val="1F4E79"/>
-                </a:solidFill>
-                <a:latin typeface="Noto Sans KR" pitchFamily="34" charset="0"/>
-                <a:ea typeface="Noto Sans KR" pitchFamily="34" charset="-122"/>
-                <a:cs typeface="Noto Sans KR" pitchFamily="34" charset="-120"/>
-              </a:rPr>
-              <a:t> </a:t>
-            </a:r>
-            <a:r>
-              <a:rPr lang="en-US" sz="1100" b="1" dirty="0" err="1">
-                <a:solidFill>
-                  <a:srgbClr val="1F4E79"/>
-                </a:solidFill>
-                <a:latin typeface="Noto Sans KR" pitchFamily="34" charset="0"/>
-                <a:ea typeface="Noto Sans KR" pitchFamily="34" charset="-122"/>
-                <a:cs typeface="Noto Sans KR" pitchFamily="34" charset="-120"/>
-              </a:rPr>
-              <a:t>방문인구</a:t>
-            </a:r>
-            <a:r>
-              <a:rPr lang="en-US" sz="1100" b="1" dirty="0">
-                <a:solidFill>
-                  <a:srgbClr val="1F4E79"/>
-                </a:solidFill>
-                <a:latin typeface="Noto Sans KR" pitchFamily="34" charset="0"/>
-                <a:ea typeface="Noto Sans KR" pitchFamily="34" charset="-122"/>
-                <a:cs typeface="Noto Sans KR" pitchFamily="34" charset="-120"/>
-              </a:rPr>
-              <a:t> 비교</a:t>
-            </a:r>
-            <a:endParaRPr lang="en-US" sz="1100" dirty="0"/>
-          </a:p>
-        </p:txBody>
-      </p:sp>
-      <p:sp>
-        <p:nvSpPr>
           <p:cNvPr id="71" name="Text 10">
             <a:extLst>
               <a:ext uri="{FF2B5EF4-FFF2-40B4-BE49-F238E27FC236}">
-                <a16:creationId xmlns:a16="http://schemas.microsoft.com/office/drawing/2014/main" id="{BC57060E-C183-6868-1F12-1C13CAABAC28}"/>
+                <a16:creationId xmlns:a16="http://schemas.microsoft.com/office/drawing/2014/main" id="{4F36C075-9081-C7D8-F53D-10B9A47A5B99}"/>
               </a:ext>
             </a:extLst>
           </p:cNvPr>
@@ -10409,7 +10986,7 @@
           <p:cNvPr id="72" name="Text 19">
             <a:extLst>
               <a:ext uri="{FF2B5EF4-FFF2-40B4-BE49-F238E27FC236}">
-                <a16:creationId xmlns:a16="http://schemas.microsoft.com/office/drawing/2014/main" id="{CA7C3BC7-79DF-7AD2-B7F6-EC2075CE2E53}"/>
+                <a16:creationId xmlns:a16="http://schemas.microsoft.com/office/drawing/2014/main" id="{EA6D45BF-327C-D89A-62C7-0919F270F91A}"/>
               </a:ext>
             </a:extLst>
           </p:cNvPr>
@@ -10454,7 +11031,7 @@
           <p:cNvPr id="73" name="Text 31">
             <a:extLst>
               <a:ext uri="{FF2B5EF4-FFF2-40B4-BE49-F238E27FC236}">
-                <a16:creationId xmlns:a16="http://schemas.microsoft.com/office/drawing/2014/main" id="{B89BAFB9-B00B-4015-4AD6-0B43108797B2}"/>
+                <a16:creationId xmlns:a16="http://schemas.microsoft.com/office/drawing/2014/main" id="{C901E123-41AB-9775-58DE-EBDFD178A481}"/>
               </a:ext>
             </a:extLst>
           </p:cNvPr>
@@ -10507,10 +11084,10 @@
       </p:sp>
       <p:graphicFrame>
         <p:nvGraphicFramePr>
-          <p:cNvPr id="75" name="SL21_chart">
+          <p:cNvPr id="5" name="SL21_chart">
             <a:extLst>
               <a:ext uri="{FF2B5EF4-FFF2-40B4-BE49-F238E27FC236}">
-                <a16:creationId xmlns:a16="http://schemas.microsoft.com/office/drawing/2014/main" id="{0A357014-3227-9CBA-B3CE-31D4AFC56BF9}"/>
+                <a16:creationId xmlns:a16="http://schemas.microsoft.com/office/drawing/2014/main" id="{2301BED4-2696-FF61-2D5B-454E29509A35}"/>
               </a:ext>
             </a:extLst>
           </p:cNvPr>
@@ -10518,14 +11095,14 @@
           <p:nvPr>
             <p:extLst>
               <p:ext uri="{D42A27DB-BD31-4B8C-83A1-F6EECF244321}">
-                <p14:modId xmlns:p14="http://schemas.microsoft.com/office/powerpoint/2010/main" val="1272250863"/>
+                <p14:modId xmlns:p14="http://schemas.microsoft.com/office/powerpoint/2010/main" val="4256206436"/>
               </p:ext>
             </p:extLst>
           </p:nvPr>
         </p:nvGraphicFramePr>
         <p:xfrm>
-          <a:off x="5947873" y="1795477"/>
-          <a:ext cx="4671477" cy="3847134"/>
+          <a:off x="5053584" y="1464037"/>
+          <a:ext cx="6361122" cy="4301143"/>
         </p:xfrm>
         <a:graphic>
           <a:graphicData uri="http://schemas.openxmlformats.org/drawingml/2006/chart">
@@ -10536,7 +11113,7 @@
     </p:spTree>
     <p:extLst>
       <p:ext uri="{BB962C8B-B14F-4D97-AF65-F5344CB8AC3E}">
-        <p14:creationId xmlns:p14="http://schemas.microsoft.com/office/powerpoint/2010/main" val="1470624445"/>
+        <p14:creationId xmlns:p14="http://schemas.microsoft.com/office/powerpoint/2010/main" val="2671437895"/>
       </p:ext>
     </p:extLst>
   </p:cSld>

</xml_diff>